<commit_message>
Update SDG 4 QUALITY EDUCATION.pptx
</commit_message>
<xml_diff>
--- a/other_files/SDG 4 QUALITY EDUCATION.pptx
+++ b/other_files/SDG 4 QUALITY EDUCATION.pptx
@@ -3129,7 +3129,9 @@
       </p:sp>
       <p:sp>
         <p:nvSpPr>
-          <p:cNvPr id="3" name="Freeform 3"/>
+          <p:cNvPr id="3" name="Freeform 3">
+            <a:hlinkClick r:id="rId3"/>
+          </p:cNvPr>
           <p:cNvSpPr/>
           <p:nvPr/>
         </p:nvSpPr>
@@ -3166,7 +3168,7 @@
             </a:pathLst>
           </a:custGeom>
           <a:blipFill>
-            <a:blip r:embed="rId3"/>
+            <a:blip r:embed="rId4"/>
             <a:stretch>
               <a:fillRect/>
             </a:stretch>
@@ -3212,7 +3214,7 @@
             </a:pathLst>
           </a:custGeom>
           <a:blipFill>
-            <a:blip r:embed="rId4"/>
+            <a:blip r:embed="rId5"/>
             <a:stretch>
               <a:fillRect/>
             </a:stretch>
@@ -3352,8 +3354,8 @@
         </p:nvSpPr>
         <p:spPr>
           <a:xfrm>
-            <a:off x="4670063" y="122553"/>
-            <a:ext cx="8288179" cy="1134747"/>
+            <a:off x="3298369" y="122553"/>
+            <a:ext cx="11031567" cy="1134747"/>
           </a:xfrm>
           <a:prstGeom prst="rect">
             <a:avLst/>
@@ -3387,6 +3389,59 @@
             </a:r>
           </a:p>
         </p:txBody>
+      </p:sp>
+      <p:sp>
+        <p:nvSpPr>
+          <p:cNvPr id="5" name="Freeform 3">
+            <a:hlinkClick r:id="rId4"/>
+            <a:extLst>
+              <a:ext uri="{FF2B5EF4-FFF2-40B4-BE49-F238E27FC236}">
+                <a16:creationId xmlns:a16="http://schemas.microsoft.com/office/drawing/2014/main" id="{16506B6C-FC38-E402-1DE8-2D59CE7DF943}"/>
+              </a:ext>
+            </a:extLst>
+          </p:cNvPr>
+          <p:cNvSpPr/>
+          <p:nvPr/>
+        </p:nvSpPr>
+        <p:spPr>
+          <a:xfrm>
+            <a:off x="16764000" y="8763000"/>
+            <a:ext cx="1525907" cy="1524000"/>
+          </a:xfrm>
+          <a:custGeom>
+            <a:avLst/>
+            <a:gdLst/>
+            <a:ahLst/>
+            <a:cxnLst/>
+            <a:rect l="l" t="t" r="r" b="b"/>
+            <a:pathLst>
+              <a:path w="6363143" h="6355189">
+                <a:moveTo>
+                  <a:pt x="0" y="0"/>
+                </a:moveTo>
+                <a:lnTo>
+                  <a:pt x="6363142" y="0"/>
+                </a:lnTo>
+                <a:lnTo>
+                  <a:pt x="6363142" y="6355189"/>
+                </a:lnTo>
+                <a:lnTo>
+                  <a:pt x="0" y="6355189"/>
+                </a:lnTo>
+                <a:lnTo>
+                  <a:pt x="0" y="0"/>
+                </a:lnTo>
+                <a:close/>
+              </a:path>
+            </a:pathLst>
+          </a:custGeom>
+          <a:blipFill>
+            <a:blip r:embed="rId5"/>
+            <a:stretch>
+              <a:fillRect/>
+            </a:stretch>
+          </a:blipFill>
+        </p:spPr>
       </p:sp>
     </p:spTree>
   </p:cSld>
@@ -3475,8 +3530,8 @@
         </p:nvSpPr>
         <p:spPr>
           <a:xfrm>
-            <a:off x="5896273" y="189724"/>
-            <a:ext cx="6495455" cy="1134747"/>
+            <a:off x="5571500" y="189724"/>
+            <a:ext cx="7145001" cy="1134747"/>
           </a:xfrm>
           <a:prstGeom prst="rect">
             <a:avLst/>
@@ -3497,7 +3552,7 @@
               </a:spcBef>
             </a:pPr>
             <a:r>
-              <a:rPr lang="en-US" sz="6699">
+              <a:rPr lang="en-US" sz="6699" dirty="0">
                 <a:solidFill>
                   <a:srgbClr val="FFFFFF"/>
                 </a:solidFill>
@@ -3708,6 +3763,59 @@
             </a:endParaRPr>
           </a:p>
         </p:txBody>
+      </p:sp>
+      <p:sp>
+        <p:nvSpPr>
+          <p:cNvPr id="5" name="Freeform 3">
+            <a:hlinkClick r:id="rId3"/>
+            <a:extLst>
+              <a:ext uri="{FF2B5EF4-FFF2-40B4-BE49-F238E27FC236}">
+                <a16:creationId xmlns:a16="http://schemas.microsoft.com/office/drawing/2014/main" id="{9140FDF5-E6AF-8444-0F64-4746B4AB1E22}"/>
+              </a:ext>
+            </a:extLst>
+          </p:cNvPr>
+          <p:cNvSpPr/>
+          <p:nvPr/>
+        </p:nvSpPr>
+        <p:spPr>
+          <a:xfrm>
+            <a:off x="16764000" y="8724900"/>
+            <a:ext cx="1525907" cy="1524000"/>
+          </a:xfrm>
+          <a:custGeom>
+            <a:avLst/>
+            <a:gdLst/>
+            <a:ahLst/>
+            <a:cxnLst/>
+            <a:rect l="l" t="t" r="r" b="b"/>
+            <a:pathLst>
+              <a:path w="6363143" h="6355189">
+                <a:moveTo>
+                  <a:pt x="0" y="0"/>
+                </a:moveTo>
+                <a:lnTo>
+                  <a:pt x="6363142" y="0"/>
+                </a:lnTo>
+                <a:lnTo>
+                  <a:pt x="6363142" y="6355189"/>
+                </a:lnTo>
+                <a:lnTo>
+                  <a:pt x="0" y="6355189"/>
+                </a:lnTo>
+                <a:lnTo>
+                  <a:pt x="0" y="0"/>
+                </a:lnTo>
+                <a:close/>
+              </a:path>
+            </a:pathLst>
+          </a:custGeom>
+          <a:blipFill>
+            <a:blip r:embed="rId4"/>
+            <a:stretch>
+              <a:fillRect/>
+            </a:stretch>
+          </a:blipFill>
+        </p:spPr>
       </p:sp>
     </p:spTree>
   </p:cSld>
@@ -3744,7 +3852,9 @@
       </p:grpSpPr>
       <p:sp>
         <p:nvSpPr>
-          <p:cNvPr id="2" name="Freeform 2"/>
+          <p:cNvPr id="2" name="Freeform 2">
+            <a:hlinkClick r:id="rId2"/>
+          </p:cNvPr>
           <p:cNvSpPr/>
           <p:nvPr/>
         </p:nvSpPr>
@@ -3781,7 +3891,7 @@
             </a:pathLst>
           </a:custGeom>
           <a:blipFill>
-            <a:blip r:embed="rId2"/>
+            <a:blip r:embed="rId3"/>
             <a:stretch>
               <a:fillRect t="-1715" b="-1715"/>
             </a:stretch>
@@ -3840,8 +3950,8 @@
         </p:nvSpPr>
         <p:spPr>
           <a:xfrm>
-            <a:off x="11977146" y="1181733"/>
-            <a:ext cx="6387054" cy="8211672"/>
+            <a:off x="11977146" y="1485900"/>
+            <a:ext cx="5777454" cy="7279878"/>
           </a:xfrm>
           <a:prstGeom prst="rect">
             <a:avLst/>
@@ -3855,11 +3965,11 @@
           <a:p>
             <a:pPr algn="ctr">
               <a:lnSpc>
-                <a:spcPts val="6499"/>
+                <a:spcPct val="200000"/>
               </a:lnSpc>
             </a:pPr>
             <a:r>
-              <a:rPr lang="en-US" sz="2599" dirty="0">
+              <a:rPr lang="en-US" sz="2400" dirty="0">
                 <a:solidFill>
                   <a:srgbClr val="FFFFFF"/>
                 </a:solidFill>
@@ -3874,11 +3984,11 @@
           <a:p>
             <a:pPr algn="ctr">
               <a:lnSpc>
-                <a:spcPts val="6499"/>
+                <a:spcPct val="200000"/>
               </a:lnSpc>
             </a:pPr>
             <a:r>
-              <a:rPr lang="en-US" sz="2599" dirty="0">
+              <a:rPr lang="en-US" sz="2400" dirty="0">
                 <a:solidFill>
                   <a:srgbClr val="FFFFFF"/>
                 </a:solidFill>
@@ -3893,11 +4003,11 @@
           <a:p>
             <a:pPr algn="ctr">
               <a:lnSpc>
-                <a:spcPts val="6499"/>
+                <a:spcPct val="200000"/>
               </a:lnSpc>
             </a:pPr>
             <a:r>
-              <a:rPr lang="en-US" sz="2599" dirty="0">
+              <a:rPr lang="en-US" sz="2400" dirty="0">
                 <a:solidFill>
                   <a:srgbClr val="FFFFFF"/>
                 </a:solidFill>
@@ -3912,11 +4022,11 @@
           <a:p>
             <a:pPr algn="ctr">
               <a:lnSpc>
-                <a:spcPts val="6499"/>
+                <a:spcPct val="200000"/>
               </a:lnSpc>
             </a:pPr>
             <a:r>
-              <a:rPr lang="en-US" sz="2599" dirty="0">
+              <a:rPr lang="en-US" sz="2400" dirty="0">
                 <a:solidFill>
                   <a:srgbClr val="FFFFFF"/>
                 </a:solidFill>
@@ -3931,11 +4041,11 @@
           <a:p>
             <a:pPr algn="ctr">
               <a:lnSpc>
-                <a:spcPts val="6499"/>
+                <a:spcPct val="200000"/>
               </a:lnSpc>
             </a:pPr>
             <a:r>
-              <a:rPr lang="en-US" sz="2599" dirty="0">
+              <a:rPr lang="en-US" sz="2400" dirty="0">
                 <a:solidFill>
                   <a:srgbClr val="FFFFFF"/>
                 </a:solidFill>
@@ -3950,11 +4060,11 @@
           <a:p>
             <a:pPr algn="ctr">
               <a:lnSpc>
-                <a:spcPts val="6499"/>
+                <a:spcPct val="200000"/>
               </a:lnSpc>
             </a:pPr>
             <a:r>
-              <a:rPr lang="en-US" sz="2599" dirty="0">
+              <a:rPr lang="en-US" sz="2400" dirty="0">
                 <a:solidFill>
                   <a:srgbClr val="FFFFFF"/>
                 </a:solidFill>
@@ -3969,11 +4079,11 @@
           <a:p>
             <a:pPr algn="ctr">
               <a:lnSpc>
-                <a:spcPts val="6499"/>
+                <a:spcPct val="200000"/>
               </a:lnSpc>
             </a:pPr>
             <a:r>
-              <a:rPr lang="en-US" sz="2599" dirty="0">
+              <a:rPr lang="en-US" sz="2400" dirty="0">
                 <a:solidFill>
                   <a:srgbClr val="FFFFFF"/>
                 </a:solidFill>
@@ -3988,11 +4098,11 @@
           <a:p>
             <a:pPr algn="ctr">
               <a:lnSpc>
-                <a:spcPts val="6499"/>
+                <a:spcPct val="200000"/>
               </a:lnSpc>
             </a:pPr>
             <a:r>
-              <a:rPr lang="en-US" sz="2599" dirty="0">
+              <a:rPr lang="en-US" sz="2400" dirty="0">
                 <a:solidFill>
                   <a:srgbClr val="FFFFFF"/>
                 </a:solidFill>
@@ -4007,11 +4117,11 @@
           <a:p>
             <a:pPr algn="ctr">
               <a:lnSpc>
-                <a:spcPts val="6499"/>
+                <a:spcPct val="200000"/>
               </a:lnSpc>
             </a:pPr>
             <a:r>
-              <a:rPr lang="en-US" sz="2599" dirty="0">
+              <a:rPr lang="en-US" sz="2400" dirty="0">
                 <a:solidFill>
                   <a:srgbClr val="FFFFFF"/>
                 </a:solidFill>
@@ -4026,11 +4136,11 @@
           <a:p>
             <a:pPr algn="ctr">
               <a:lnSpc>
-                <a:spcPts val="6499"/>
+                <a:spcPct val="200000"/>
               </a:lnSpc>
             </a:pPr>
             <a:r>
-              <a:rPr lang="en-US" sz="2599" dirty="0">
+              <a:rPr lang="en-US" sz="2400" dirty="0">
                 <a:solidFill>
                   <a:srgbClr val="FFFFFF"/>
                 </a:solidFill>
@@ -4041,6 +4151,110 @@
               </a:rPr>
               <a:t>Monetized coding events &amp; hackathons</a:t>
             </a:r>
+          </a:p>
+        </p:txBody>
+      </p:sp>
+      <p:sp>
+        <p:nvSpPr>
+          <p:cNvPr id="5" name="Freeform 3">
+            <a:hlinkClick r:id="rId4"/>
+            <a:extLst>
+              <a:ext uri="{FF2B5EF4-FFF2-40B4-BE49-F238E27FC236}">
+                <a16:creationId xmlns:a16="http://schemas.microsoft.com/office/drawing/2014/main" id="{ADEA291C-E2D4-B837-F59D-113850956171}"/>
+              </a:ext>
+            </a:extLst>
+          </p:cNvPr>
+          <p:cNvSpPr/>
+          <p:nvPr/>
+        </p:nvSpPr>
+        <p:spPr>
+          <a:xfrm>
+            <a:off x="16764000" y="8763000"/>
+            <a:ext cx="1525907" cy="1524000"/>
+          </a:xfrm>
+          <a:custGeom>
+            <a:avLst/>
+            <a:gdLst/>
+            <a:ahLst/>
+            <a:cxnLst/>
+            <a:rect l="l" t="t" r="r" b="b"/>
+            <a:pathLst>
+              <a:path w="6363143" h="6355189">
+                <a:moveTo>
+                  <a:pt x="0" y="0"/>
+                </a:moveTo>
+                <a:lnTo>
+                  <a:pt x="6363142" y="0"/>
+                </a:lnTo>
+                <a:lnTo>
+                  <a:pt x="6363142" y="6355189"/>
+                </a:lnTo>
+                <a:lnTo>
+                  <a:pt x="0" y="6355189"/>
+                </a:lnTo>
+                <a:lnTo>
+                  <a:pt x="0" y="0"/>
+                </a:lnTo>
+                <a:close/>
+              </a:path>
+            </a:pathLst>
+          </a:custGeom>
+          <a:blipFill>
+            <a:blip r:embed="rId5"/>
+            <a:stretch>
+              <a:fillRect/>
+            </a:stretch>
+          </a:blipFill>
+        </p:spPr>
+      </p:sp>
+      <p:sp>
+        <p:nvSpPr>
+          <p:cNvPr id="6" name="TextBox 5">
+            <a:extLst>
+              <a:ext uri="{FF2B5EF4-FFF2-40B4-BE49-F238E27FC236}">
+                <a16:creationId xmlns:a16="http://schemas.microsoft.com/office/drawing/2014/main" id="{1A0EAC5F-ECFC-8FEE-F74E-A804C23E3DF5}"/>
+              </a:ext>
+            </a:extLst>
+          </p:cNvPr>
+          <p:cNvSpPr txBox="1"/>
+          <p:nvPr/>
+        </p:nvSpPr>
+        <p:spPr>
+          <a:xfrm>
+            <a:off x="533400" y="9894332"/>
+            <a:ext cx="3581400" cy="369332"/>
+          </a:xfrm>
+          <a:prstGeom prst="rect">
+            <a:avLst/>
+          </a:prstGeom>
+          <a:noFill/>
+        </p:spPr>
+        <p:txBody>
+          <a:bodyPr wrap="square" rtlCol="0">
+            <a:spAutoFit/>
+          </a:bodyPr>
+          <a:lstStyle/>
+          <a:p>
+            <a:r>
+              <a:rPr lang="en-IN" dirty="0">
+                <a:solidFill>
+                  <a:srgbClr val="00B0F0"/>
+                </a:solidFill>
+                <a:hlinkClick r:id="rId2">
+                  <a:extLst>
+                    <a:ext uri="{A12FA001-AC4F-418D-AE19-62706E023703}">
+                      <ahyp:hlinkClr xmlns:ahyp="http://schemas.microsoft.com/office/drawing/2018/hyperlinkcolor" val="tx"/>
+                    </a:ext>
+                  </a:extLst>
+                </a:hlinkClick>
+              </a:rPr>
+              <a:t>Click here to open the Lean Canvas</a:t>
+            </a:r>
+            <a:endParaRPr lang="en-IN" dirty="0">
+              <a:solidFill>
+                <a:srgbClr val="00B0F0"/>
+              </a:solidFill>
+            </a:endParaRPr>
           </a:p>
         </p:txBody>
       </p:sp>
@@ -4079,7 +4293,9 @@
       </p:grpSpPr>
       <p:sp>
         <p:nvSpPr>
-          <p:cNvPr id="2" name="Freeform 2"/>
+          <p:cNvPr id="2" name="Freeform 2">
+            <a:hlinkClick r:id="rId2"/>
+          </p:cNvPr>
           <p:cNvSpPr/>
           <p:nvPr/>
         </p:nvSpPr>
@@ -4116,7 +4332,7 @@
             </a:pathLst>
           </a:custGeom>
           <a:blipFill>
-            <a:blip r:embed="rId2"/>
+            <a:blip r:embed="rId3"/>
             <a:stretch>
               <a:fillRect/>
             </a:stretch>
@@ -4131,8 +4347,8 @@
         </p:nvSpPr>
         <p:spPr>
           <a:xfrm>
-            <a:off x="6915567" y="177406"/>
-            <a:ext cx="4456867" cy="1134747"/>
+            <a:off x="6692723" y="177406"/>
+            <a:ext cx="4902554" cy="1134747"/>
           </a:xfrm>
           <a:prstGeom prst="rect">
             <a:avLst/>
@@ -4182,7 +4398,7 @@
           <p:nvPr/>
         </p:nvPicPr>
         <p:blipFill rotWithShape="1">
-          <a:blip r:embed="rId3">
+          <a:blip r:embed="rId4">
             <a:extLst>
               <a:ext uri="{28A0092B-C50C-407E-A947-70E740481C1C}">
                 <a14:useLocalDpi xmlns:a14="http://schemas.microsoft.com/office/drawing/2010/main" val="0"/>
@@ -4214,6 +4430,110 @@
           </a:extLst>
         </p:spPr>
       </p:pic>
+      <p:sp>
+        <p:nvSpPr>
+          <p:cNvPr id="4" name="Freeform 3">
+            <a:hlinkClick r:id="rId5"/>
+            <a:extLst>
+              <a:ext uri="{FF2B5EF4-FFF2-40B4-BE49-F238E27FC236}">
+                <a16:creationId xmlns:a16="http://schemas.microsoft.com/office/drawing/2014/main" id="{7397873A-CFBF-8713-10EC-34F70982DAC8}"/>
+              </a:ext>
+            </a:extLst>
+          </p:cNvPr>
+          <p:cNvSpPr/>
+          <p:nvPr/>
+        </p:nvSpPr>
+        <p:spPr>
+          <a:xfrm>
+            <a:off x="16764000" y="8763000"/>
+            <a:ext cx="1525907" cy="1524000"/>
+          </a:xfrm>
+          <a:custGeom>
+            <a:avLst/>
+            <a:gdLst/>
+            <a:ahLst/>
+            <a:cxnLst/>
+            <a:rect l="l" t="t" r="r" b="b"/>
+            <a:pathLst>
+              <a:path w="6363143" h="6355189">
+                <a:moveTo>
+                  <a:pt x="0" y="0"/>
+                </a:moveTo>
+                <a:lnTo>
+                  <a:pt x="6363142" y="0"/>
+                </a:lnTo>
+                <a:lnTo>
+                  <a:pt x="6363142" y="6355189"/>
+                </a:lnTo>
+                <a:lnTo>
+                  <a:pt x="0" y="6355189"/>
+                </a:lnTo>
+                <a:lnTo>
+                  <a:pt x="0" y="0"/>
+                </a:lnTo>
+                <a:close/>
+              </a:path>
+            </a:pathLst>
+          </a:custGeom>
+          <a:blipFill>
+            <a:blip r:embed="rId6"/>
+            <a:stretch>
+              <a:fillRect/>
+            </a:stretch>
+          </a:blipFill>
+        </p:spPr>
+      </p:sp>
+      <p:sp>
+        <p:nvSpPr>
+          <p:cNvPr id="5" name="TextBox 4">
+            <a:extLst>
+              <a:ext uri="{FF2B5EF4-FFF2-40B4-BE49-F238E27FC236}">
+                <a16:creationId xmlns:a16="http://schemas.microsoft.com/office/drawing/2014/main" id="{015E50B4-BFC0-5702-CBE3-B4474EDA02EA}"/>
+              </a:ext>
+            </a:extLst>
+          </p:cNvPr>
+          <p:cNvSpPr txBox="1"/>
+          <p:nvPr/>
+        </p:nvSpPr>
+        <p:spPr>
+          <a:xfrm>
+            <a:off x="922834" y="9258300"/>
+            <a:ext cx="5664023" cy="369332"/>
+          </a:xfrm>
+          <a:prstGeom prst="rect">
+            <a:avLst/>
+          </a:prstGeom>
+          <a:noFill/>
+        </p:spPr>
+        <p:txBody>
+          <a:bodyPr wrap="square" rtlCol="0">
+            <a:spAutoFit/>
+          </a:bodyPr>
+          <a:lstStyle/>
+          <a:p>
+            <a:r>
+              <a:rPr lang="en-IN" dirty="0">
+                <a:solidFill>
+                  <a:srgbClr val="00B0F0"/>
+                </a:solidFill>
+                <a:hlinkClick r:id="rId2">
+                  <a:extLst>
+                    <a:ext uri="{A12FA001-AC4F-418D-AE19-62706E023703}">
+                      <ahyp:hlinkClr xmlns:ahyp="http://schemas.microsoft.com/office/drawing/2018/hyperlinkcolor" val="tx"/>
+                    </a:ext>
+                  </a:extLst>
+                </a:hlinkClick>
+              </a:rPr>
+              <a:t>Click here to open the Concept Note</a:t>
+            </a:r>
+            <a:endParaRPr lang="en-IN" dirty="0">
+              <a:solidFill>
+                <a:srgbClr val="00B0F0"/>
+              </a:solidFill>
+            </a:endParaRPr>
+          </a:p>
+        </p:txBody>
+      </p:sp>
     </p:spTree>
   </p:cSld>
   <p:clrMapOvr>
@@ -4255,7 +4575,7 @@
         </p:nvSpPr>
         <p:spPr>
           <a:xfrm>
-            <a:off x="887609" y="2152186"/>
+            <a:off x="887609" y="1333500"/>
             <a:ext cx="16512783" cy="7475119"/>
           </a:xfrm>
           <a:custGeom>
@@ -4301,8 +4621,8 @@
         </p:nvSpPr>
         <p:spPr>
           <a:xfrm>
-            <a:off x="4941629" y="404176"/>
-            <a:ext cx="8404741" cy="1134747"/>
+            <a:off x="4521392" y="404176"/>
+            <a:ext cx="9245215" cy="1134747"/>
           </a:xfrm>
           <a:prstGeom prst="rect">
             <a:avLst/>
@@ -4333,6 +4653,100 @@
                 <a:sym typeface="Anton"/>
               </a:rPr>
               <a:t>Resources and Roadmap</a:t>
+            </a:r>
+          </a:p>
+        </p:txBody>
+      </p:sp>
+      <p:sp>
+        <p:nvSpPr>
+          <p:cNvPr id="4" name="Freeform 3">
+            <a:hlinkClick r:id="rId3"/>
+            <a:extLst>
+              <a:ext uri="{FF2B5EF4-FFF2-40B4-BE49-F238E27FC236}">
+                <a16:creationId xmlns:a16="http://schemas.microsoft.com/office/drawing/2014/main" id="{8F807121-14ED-D407-AEC7-1068D2350322}"/>
+              </a:ext>
+            </a:extLst>
+          </p:cNvPr>
+          <p:cNvSpPr/>
+          <p:nvPr/>
+        </p:nvSpPr>
+        <p:spPr>
+          <a:xfrm>
+            <a:off x="16764000" y="8763000"/>
+            <a:ext cx="1525907" cy="1524000"/>
+          </a:xfrm>
+          <a:custGeom>
+            <a:avLst/>
+            <a:gdLst/>
+            <a:ahLst/>
+            <a:cxnLst/>
+            <a:rect l="l" t="t" r="r" b="b"/>
+            <a:pathLst>
+              <a:path w="6363143" h="6355189">
+                <a:moveTo>
+                  <a:pt x="0" y="0"/>
+                </a:moveTo>
+                <a:lnTo>
+                  <a:pt x="6363142" y="0"/>
+                </a:lnTo>
+                <a:lnTo>
+                  <a:pt x="6363142" y="6355189"/>
+                </a:lnTo>
+                <a:lnTo>
+                  <a:pt x="0" y="6355189"/>
+                </a:lnTo>
+                <a:lnTo>
+                  <a:pt x="0" y="0"/>
+                </a:lnTo>
+                <a:close/>
+              </a:path>
+            </a:pathLst>
+          </a:custGeom>
+          <a:blipFill>
+            <a:blip r:embed="rId4"/>
+            <a:stretch>
+              <a:fillRect/>
+            </a:stretch>
+          </a:blipFill>
+        </p:spPr>
+      </p:sp>
+      <p:sp>
+        <p:nvSpPr>
+          <p:cNvPr id="6" name="TextBox 5">
+            <a:hlinkClick r:id="rId3"/>
+            <a:extLst>
+              <a:ext uri="{FF2B5EF4-FFF2-40B4-BE49-F238E27FC236}">
+                <a16:creationId xmlns:a16="http://schemas.microsoft.com/office/drawing/2014/main" id="{7FD2F5BC-C796-070F-402C-2EEAD8A93872}"/>
+              </a:ext>
+            </a:extLst>
+          </p:cNvPr>
+          <p:cNvSpPr txBox="1"/>
+          <p:nvPr/>
+        </p:nvSpPr>
+        <p:spPr>
+          <a:xfrm>
+            <a:off x="6465341" y="8953500"/>
+            <a:ext cx="5664023" cy="523220"/>
+          </a:xfrm>
+          <a:prstGeom prst="rect">
+            <a:avLst/>
+          </a:prstGeom>
+          <a:noFill/>
+        </p:spPr>
+        <p:txBody>
+          <a:bodyPr wrap="square" rtlCol="0">
+            <a:spAutoFit/>
+          </a:bodyPr>
+          <a:lstStyle/>
+          <a:p>
+            <a:pPr algn="ctr"/>
+            <a:r>
+              <a:rPr lang="en-IN" sz="2800" u="sng" dirty="0">
+                <a:solidFill>
+                  <a:srgbClr val="00B0F0"/>
+                </a:solidFill>
+              </a:rPr>
+              <a:t>Click here to open the Agent</a:t>
             </a:r>
           </a:p>
         </p:txBody>

</xml_diff>